<commit_message>
add background music in title
</commit_message>
<xml_diff>
--- a/docs/3차 발표.pptx
+++ b/docs/3차 발표.pptx
@@ -3736,7 +3736,7 @@
           <p:nvPr>
             <p:extLst>
               <p:ext uri="{D42A27DB-BD31-4B8C-83A1-F6EECF244321}">
-                <p14:modId xmlns:p14="http://schemas.microsoft.com/office/powerpoint/2010/main" val="1695108015"/>
+                <p14:modId xmlns:p14="http://schemas.microsoft.com/office/powerpoint/2010/main" val="1119906041"/>
               </p:ext>
             </p:extLst>
           </p:nvPr>
@@ -8395,7 +8395,7 @@
                           <a:ea typeface="맑은 고딕" panose="020B0503020000020004" pitchFamily="50" charset="-127"/>
                           <a:cs typeface="+mn-cs"/>
                         </a:rPr>
-                        <a:t>50%</a:t>
+                        <a:t>90%</a:t>
                       </a:r>
                       <a:endParaRPr kumimoji="0" lang="ko-KR" altLang="en-US" sz="1400" b="1" i="0" u="none" strike="noStrike" kern="1200" cap="none" spc="0" normalizeH="0" baseline="0" noProof="0" dirty="0">
                         <a:ln>
@@ -8787,6 +8787,23 @@
                         <a:tabLst/>
                         <a:defRPr/>
                       </a:pPr>
+                      <a:r>
+                        <a:rPr kumimoji="0" lang="en-US" altLang="ko-KR" sz="1400" b="1" i="0" u="none" strike="noStrike" kern="1200" cap="none" spc="0" normalizeH="0" baseline="0" noProof="0" dirty="0">
+                          <a:ln>
+                            <a:noFill/>
+                          </a:ln>
+                          <a:solidFill>
+                            <a:prstClr val="black"/>
+                          </a:solidFill>
+                          <a:effectLst/>
+                          <a:uLnTx/>
+                          <a:uFillTx/>
+                          <a:latin typeface="맑은 고딕" panose="020F0502020204030204"/>
+                          <a:ea typeface="맑은 고딕" panose="020B0503020000020004" pitchFamily="50" charset="-127"/>
+                          <a:cs typeface="+mn-cs"/>
+                        </a:rPr>
+                        <a:t>60%</a:t>
+                      </a:r>
                       <a:endParaRPr kumimoji="0" lang="ko-KR" altLang="en-US" sz="1400" b="1" i="0" u="none" strike="noStrike" kern="1200" cap="none" spc="0" normalizeH="0" baseline="0" noProof="0" dirty="0">
                         <a:ln>
                           <a:noFill/>

</xml_diff>